<commit_message>
simplify some scripts for the cohort and improve commenting.
</commit_message>
<xml_diff>
--- a/Lessons/C_R_practice_Viz_MoreEDA/AA_R_Classes_Joins.pptx
+++ b/Lessons/C_R_practice_Viz_MoreEDA/AA_R_Classes_Joins.pptx
@@ -211,7 +211,7 @@
           <a:p>
             <a:fld id="{C333ABA6-B72D-4ED4-A6E7-13A0DAE65F1A}" type="datetimeFigureOut">
               <a:rPr lang="en-US" smtClean="0"/>
-              <a:t>9/19/22</a:t>
+              <a:t>9/25/23</a:t>
             </a:fld>
             <a:endParaRPr lang="en-US"/>
           </a:p>
@@ -1249,7 +1249,7 @@
           <a:p>
             <a:fld id="{5738B90E-0779-4C36-915C-6F05FCD89456}" type="datetime1">
               <a:rPr lang="en-US" smtClean="0"/>
-              <a:t>9/19/22</a:t>
+              <a:t>9/25/23</a:t>
             </a:fld>
             <a:endParaRPr lang="en-US"/>
           </a:p>
@@ -1359,7 +1359,7 @@
           <a:p>
             <a:r>
               <a:rPr lang="en-US" dirty="0"/>
-              <a:t>Kwartler CSCI S-96</a:t>
+              <a:t>Kwartler </a:t>
             </a:r>
           </a:p>
         </p:txBody>
@@ -1467,7 +1467,7 @@
           <a:p>
             <a:fld id="{7B9EA29D-D431-42FE-B7B6-AAE4454C77D3}" type="datetime1">
               <a:rPr lang="en-US" smtClean="0"/>
-              <a:t>9/19/22</a:t>
+              <a:t>9/25/23</a:t>
             </a:fld>
             <a:endParaRPr lang="en-US"/>
           </a:p>
@@ -1489,8 +1489,8 @@
           <a:lstStyle/>
           <a:p>
             <a:r>
-              <a:rPr lang="en-US"/>
-              <a:t>Kwartler CSCI S-96</a:t>
+              <a:rPr lang="en-US" dirty="0"/>
+              <a:t>Kwartler </a:t>
             </a:r>
           </a:p>
         </p:txBody>
@@ -1727,7 +1727,7 @@
           <a:p>
             <a:fld id="{690D8A1E-EA8F-46C1-B891-AE0C00D9C314}" type="datetime1">
               <a:rPr lang="en-US" smtClean="0"/>
-              <a:t>9/19/22</a:t>
+              <a:t>9/25/23</a:t>
             </a:fld>
             <a:endParaRPr lang="en-US"/>
           </a:p>
@@ -1883,7 +1883,7 @@
           <a:p>
             <a:r>
               <a:rPr lang="en-US" dirty="0"/>
-              <a:t>Kwartler CSCI S-96</a:t>
+              <a:t>Kwartler </a:t>
             </a:r>
           </a:p>
         </p:txBody>
@@ -2021,7 +2021,7 @@
           <a:p>
             <a:fld id="{D753EFC8-4232-4598-94F6-94C0EBAFC469}" type="datetime1">
               <a:rPr lang="en-US" smtClean="0"/>
-              <a:t>9/19/22</a:t>
+              <a:t>9/25/23</a:t>
             </a:fld>
             <a:endParaRPr lang="en-US"/>
           </a:p>
@@ -2131,7 +2131,7 @@
           <a:p>
             <a:r>
               <a:rPr lang="en-US" dirty="0"/>
-              <a:t>Kwartler CSCI S-96</a:t>
+              <a:t>Kwartler </a:t>
             </a:r>
           </a:p>
         </p:txBody>
@@ -2336,7 +2336,7 @@
           <a:p>
             <a:fld id="{F3161074-1C18-4AE7-957D-F18524378C85}" type="datetime1">
               <a:rPr lang="en-US" smtClean="0"/>
-              <a:t>9/19/22</a:t>
+              <a:t>9/25/23</a:t>
             </a:fld>
             <a:endParaRPr lang="en-US"/>
           </a:p>
@@ -2446,7 +2446,7 @@
           <a:p>
             <a:r>
               <a:rPr lang="en-US" dirty="0"/>
-              <a:t>Kwartler CSCI S-96</a:t>
+              <a:t>Kwartler </a:t>
             </a:r>
           </a:p>
         </p:txBody>
@@ -2610,7 +2610,7 @@
           <a:p>
             <a:fld id="{69BE256C-8D9A-4404-B47D-41A1AE514425}" type="datetime1">
               <a:rPr lang="en-US" smtClean="0"/>
-              <a:t>9/19/22</a:t>
+              <a:t>9/25/23</a:t>
             </a:fld>
             <a:endParaRPr lang="en-US"/>
           </a:p>
@@ -2750,7 +2750,7 @@
           <a:p>
             <a:r>
               <a:rPr lang="en-US" dirty="0"/>
-              <a:t>Kwartler CSCI S-96</a:t>
+              <a:t>Kwartler </a:t>
             </a:r>
           </a:p>
         </p:txBody>
@@ -3044,7 +3044,7 @@
           <a:p>
             <a:fld id="{66CB2154-9035-4012-8189-BAAB61C5A5EE}" type="datetime1">
               <a:rPr lang="en-US" smtClean="0"/>
-              <a:t>9/19/22</a:t>
+              <a:t>9/25/23</a:t>
             </a:fld>
             <a:endParaRPr lang="en-US"/>
           </a:p>
@@ -3066,8 +3066,8 @@
           <a:lstStyle/>
           <a:p>
             <a:r>
-              <a:rPr lang="en-US"/>
-              <a:t>Kwartler CSCI S-96</a:t>
+              <a:rPr lang="en-US" dirty="0"/>
+              <a:t>Kwartler </a:t>
             </a:r>
           </a:p>
         </p:txBody>
@@ -3218,7 +3218,7 @@
           <a:p>
             <a:fld id="{6700A58B-DD98-43D0-B791-721480A02982}" type="datetime1">
               <a:rPr lang="en-US" smtClean="0"/>
-              <a:t>9/19/22</a:t>
+              <a:t>9/25/23</a:t>
             </a:fld>
             <a:endParaRPr lang="en-US"/>
           </a:p>
@@ -3358,7 +3358,7 @@
           <a:p>
             <a:r>
               <a:rPr lang="en-US" dirty="0"/>
-              <a:t>Kwartler CSCI S-96</a:t>
+              <a:t>Kwartler </a:t>
             </a:r>
           </a:p>
         </p:txBody>
@@ -3410,7 +3410,7 @@
           <a:p>
             <a:fld id="{7DB6E382-4F61-4E24-BE1A-377EC83D0E3A}" type="datetime1">
               <a:rPr lang="en-US" smtClean="0"/>
-              <a:t>9/19/22</a:t>
+              <a:t>9/25/23</a:t>
             </a:fld>
             <a:endParaRPr lang="en-US"/>
           </a:p>
@@ -3520,7 +3520,7 @@
           <a:p>
             <a:r>
               <a:rPr lang="en-US" dirty="0"/>
-              <a:t>Kwartler CSCI S-96</a:t>
+              <a:t>Kwartler </a:t>
             </a:r>
           </a:p>
         </p:txBody>
@@ -3721,7 +3721,7 @@
           <a:p>
             <a:fld id="{4142EED6-FC16-45B9-B8C4-2BC5DBA88325}" type="datetime1">
               <a:rPr lang="en-US" smtClean="0"/>
-              <a:t>9/19/22</a:t>
+              <a:t>9/25/23</a:t>
             </a:fld>
             <a:endParaRPr lang="en-US"/>
           </a:p>
@@ -3861,7 +3861,7 @@
           <a:p>
             <a:r>
               <a:rPr lang="en-US" dirty="0"/>
-              <a:t>Kwartler CSCI S-96</a:t>
+              <a:t>Kwartler </a:t>
             </a:r>
           </a:p>
         </p:txBody>
@@ -4039,7 +4039,7 @@
           <a:p>
             <a:fld id="{DF59512B-4F1D-43D7-8819-2F53FEF69650}" type="datetime1">
               <a:rPr lang="en-US" smtClean="0"/>
-              <a:t>9/19/22</a:t>
+              <a:t>9/25/23</a:t>
             </a:fld>
             <a:endParaRPr lang="en-US"/>
           </a:p>
@@ -4179,7 +4179,7 @@
           <a:p>
             <a:r>
               <a:rPr lang="en-US" dirty="0"/>
-              <a:t>Kwartler CSCI S-96</a:t>
+              <a:t>Kwartler </a:t>
             </a:r>
           </a:p>
         </p:txBody>
@@ -4315,7 +4315,7 @@
           <a:p>
             <a:fld id="{08437B94-E2BF-44DC-ADC5-B05FC9934E9D}" type="datetime1">
               <a:rPr lang="en-US" smtClean="0"/>
-              <a:t>9/19/22</a:t>
+              <a:t>9/25/23</a:t>
             </a:fld>
             <a:endParaRPr lang="en-US"/>
           </a:p>
@@ -4356,7 +4356,7 @@
           <a:p>
             <a:r>
               <a:rPr lang="en-US" dirty="0"/>
-              <a:t>Kwartler CSCI S-96</a:t>
+              <a:t>Kwartler </a:t>
             </a:r>
           </a:p>
         </p:txBody>
@@ -5006,7 +5006,7 @@
           <a:p>
             <a:fld id="{D753EFC8-4232-4598-94F6-94C0EBAFC469}" type="datetime1">
               <a:rPr lang="en-US" smtClean="0"/>
-              <a:t>9/19/22</a:t>
+              <a:t>9/25/23</a:t>
             </a:fld>
             <a:endParaRPr lang="en-US" dirty="0"/>
           </a:p>
@@ -7038,7 +7038,7 @@
           <a:p>
             <a:r>
               <a:rPr lang="en-US" dirty="0"/>
-              <a:t>Kwartler CSCI E-96</a:t>
+              <a:t>Kwartler </a:t>
             </a:r>
           </a:p>
         </p:txBody>
@@ -7097,7 +7097,7 @@
                 </a:solidFill>
               </a:rPr>
               <a:pPr/>
-              <a:t>9/19/22</a:t>
+              <a:t>9/25/23</a:t>
             </a:fld>
             <a:endParaRPr lang="en-US">
               <a:solidFill>
@@ -7411,7 +7411,7 @@
                   </a:prstClr>
                 </a:solidFill>
               </a:rPr>
-              <a:t>Kwartler CSCI 96</a:t>
+              <a:t>Kwartler </a:t>
             </a:r>
           </a:p>
         </p:txBody>
@@ -7974,7 +7974,7 @@
                 </a:solidFill>
               </a:rPr>
               <a:pPr/>
-              <a:t>9/19/22</a:t>
+              <a:t>9/25/23</a:t>
             </a:fld>
             <a:endParaRPr lang="en-US">
               <a:solidFill>
@@ -8781,7 +8781,7 @@
                   </a:prstClr>
                 </a:solidFill>
               </a:rPr>
-              <a:t>Kwartler CSCI 96</a:t>
+              <a:t>Kwartler </a:t>
             </a:r>
           </a:p>
         </p:txBody>
@@ -9256,7 +9256,7 @@
                 </a:solidFill>
               </a:rPr>
               <a:pPr/>
-              <a:t>9/19/22</a:t>
+              <a:t>9/25/23</a:t>
             </a:fld>
             <a:endParaRPr lang="en-US">
               <a:solidFill>
@@ -10188,7 +10188,7 @@
                   </a:prstClr>
                 </a:solidFill>
               </a:rPr>
-              <a:t>Kwartler CSCI 96</a:t>
+              <a:t>Kwartler </a:t>
             </a:r>
           </a:p>
         </p:txBody>
@@ -10611,7 +10611,7 @@
                 </a:solidFill>
               </a:rPr>
               <a:pPr/>
-              <a:t>9/19/22</a:t>
+              <a:t>9/25/23</a:t>
             </a:fld>
             <a:endParaRPr lang="en-US">
               <a:solidFill>
@@ -11516,7 +11516,7 @@
                   </a:prstClr>
                 </a:solidFill>
               </a:rPr>
-              <a:t>Kwartler CSCI 96</a:t>
+              <a:t>Kwartler </a:t>
             </a:r>
           </a:p>
         </p:txBody>
@@ -12063,7 +12063,7 @@
                 </a:solidFill>
               </a:rPr>
               <a:pPr/>
-              <a:t>9/19/22</a:t>
+              <a:t>9/25/23</a:t>
             </a:fld>
             <a:endParaRPr lang="en-US">
               <a:solidFill>
@@ -12927,7 +12927,7 @@
                   </a:prstClr>
                 </a:solidFill>
               </a:rPr>
-              <a:t>Kwartler CSCI 96</a:t>
+              <a:t>Kwartler </a:t>
             </a:r>
           </a:p>
         </p:txBody>
@@ -13455,7 +13455,7 @@
           <a:p>
             <a:fld id="{D753EFC8-4232-4598-94F6-94C0EBAFC469}" type="datetime1">
               <a:rPr lang="en-US" smtClean="0"/>
-              <a:t>9/19/22</a:t>
+              <a:t>9/25/23</a:t>
             </a:fld>
             <a:endParaRPr lang="en-US"/>
           </a:p>
@@ -13650,7 +13650,7 @@
           <a:p>
             <a:r>
               <a:rPr lang="en-US" dirty="0"/>
-              <a:t>Kwartler CSCI E-96</a:t>
+              <a:t>Kwartler </a:t>
             </a:r>
           </a:p>
         </p:txBody>
@@ -13729,7 +13729,7 @@
           <a:p>
             <a:fld id="{D753EFC8-4232-4598-94F6-94C0EBAFC469}" type="datetime1">
               <a:rPr lang="en-US" smtClean="0"/>
-              <a:t>9/19/22</a:t>
+              <a:t>9/25/23</a:t>
             </a:fld>
             <a:endParaRPr lang="en-US"/>
           </a:p>
@@ -15216,7 +15216,7 @@
           <a:p>
             <a:r>
               <a:rPr lang="en-US" dirty="0"/>
-              <a:t>Kwartler CSCI E-96</a:t>
+              <a:t>Kwartler </a:t>
             </a:r>
           </a:p>
         </p:txBody>
@@ -15295,7 +15295,7 @@
           <a:p>
             <a:fld id="{D753EFC8-4232-4598-94F6-94C0EBAFC469}" type="datetime1">
               <a:rPr lang="en-US" smtClean="0"/>
-              <a:t>9/19/22</a:t>
+              <a:t>9/25/23</a:t>
             </a:fld>
             <a:endParaRPr lang="en-US"/>
           </a:p>
@@ -16074,7 +16074,7 @@
           <a:p>
             <a:r>
               <a:rPr lang="en-US" dirty="0"/>
-              <a:t>Kwartler CSCI E-96</a:t>
+              <a:t>Kwartler </a:t>
             </a:r>
           </a:p>
         </p:txBody>
@@ -16153,7 +16153,7 @@
           <a:p>
             <a:fld id="{D753EFC8-4232-4598-94F6-94C0EBAFC469}" type="datetime1">
               <a:rPr lang="en-US" smtClean="0"/>
-              <a:t>9/19/22</a:t>
+              <a:t>9/25/23</a:t>
             </a:fld>
             <a:endParaRPr lang="en-US"/>
           </a:p>
@@ -17805,7 +17805,7 @@
           <a:p>
             <a:r>
               <a:rPr lang="en-US" dirty="0"/>
-              <a:t>Kwartler CSCI E-96</a:t>
+              <a:t>Kwartler </a:t>
             </a:r>
           </a:p>
         </p:txBody>
@@ -17879,7 +17879,7 @@
           <a:p>
             <a:fld id="{D753EFC8-4232-4598-94F6-94C0EBAFC469}" type="datetime1">
               <a:rPr lang="en-US" smtClean="0"/>
-              <a:t>9/19/22</a:t>
+              <a:t>9/25/23</a:t>
             </a:fld>
             <a:endParaRPr lang="en-US"/>
           </a:p>
@@ -22717,7 +22717,7 @@
           <a:p>
             <a:r>
               <a:rPr lang="en-US" dirty="0"/>
-              <a:t>Kwartler CSCI E-96</a:t>
+              <a:t>Kwartler </a:t>
             </a:r>
           </a:p>
         </p:txBody>
@@ -22769,7 +22769,7 @@
           <a:p>
             <a:fld id="{D753EFC8-4232-4598-94F6-94C0EBAFC469}" type="datetime1">
               <a:rPr lang="en-US" smtClean="0"/>
-              <a:t>9/19/22</a:t>
+              <a:t>9/25/23</a:t>
             </a:fld>
             <a:endParaRPr lang="en-US"/>
           </a:p>
@@ -27638,7 +27638,7 @@
           <a:p>
             <a:r>
               <a:rPr lang="en-US" dirty="0"/>
-              <a:t>Kwartler CSCI E-96</a:t>
+              <a:t>Kwartler </a:t>
             </a:r>
           </a:p>
         </p:txBody>
@@ -27712,7 +27712,7 @@
           <a:p>
             <a:fld id="{D753EFC8-4232-4598-94F6-94C0EBAFC469}" type="datetime1">
               <a:rPr lang="en-US" smtClean="0"/>
-              <a:t>9/19/22</a:t>
+              <a:t>9/25/23</a:t>
             </a:fld>
             <a:endParaRPr lang="en-US"/>
           </a:p>
@@ -32554,7 +32554,7 @@
           <a:p>
             <a:r>
               <a:rPr lang="en-US" dirty="0"/>
-              <a:t>Kwartler CSCI E-96</a:t>
+              <a:t>Kwartler </a:t>
             </a:r>
           </a:p>
         </p:txBody>
@@ -32640,7 +32640,7 @@
           <a:p>
             <a:fld id="{D753EFC8-4232-4598-94F6-94C0EBAFC469}" type="datetime1">
               <a:rPr lang="en-US" smtClean="0"/>
-              <a:t>9/19/22</a:t>
+              <a:t>9/25/23</a:t>
             </a:fld>
             <a:endParaRPr lang="en-US"/>
           </a:p>
@@ -33280,7 +33280,7 @@
           <a:p>
             <a:r>
               <a:rPr lang="en-US" dirty="0"/>
-              <a:t>Kwartler CSCI E-96</a:t>
+              <a:t>Kwartler </a:t>
             </a:r>
           </a:p>
         </p:txBody>
@@ -33391,7 +33391,7 @@
           <a:p>
             <a:fld id="{D753EFC8-4232-4598-94F6-94C0EBAFC469}" type="datetime1">
               <a:rPr lang="en-US" smtClean="0"/>
-              <a:t>9/19/22</a:t>
+              <a:t>9/25/23</a:t>
             </a:fld>
             <a:endParaRPr lang="en-US"/>
           </a:p>
@@ -33448,10 +33448,9 @@
           <a:lstStyle/>
           <a:p>
             <a:r>
-              <a:rPr lang="en-US"/>
-              <a:t>Kwartler CSCI S-96</a:t>
+              <a:rPr lang="en-US" dirty="0"/>
+              <a:t>Kwartler </a:t>
             </a:r>
-            <a:endParaRPr lang="en-US" dirty="0"/>
           </a:p>
         </p:txBody>
       </p:sp>

</xml_diff>